<commit_message>
Enhance presentation with BIM and Parametric Modeling slides
- Added "What is BIM?" slide explaining Building Information Modeling
- Added "Parametric Modeling" slide explaining smart objects in Revit
- Enhanced architecture diagram with data flow explanations
- Fixed "Digital" typo on Future Vision slide
- Added GitHub URL (github.com/Demolinator/Revit-MCP-CS)
- Updated README with presentation overview and phone number reminder
- 12 slides total (was 10)

Co-Authored-By: Claude Opus 4.6 <noreply@anthropic.com>
</commit_message>
<xml_diff>
--- a/presentation/Revit-MCP-Presentation.pptx
+++ b/presentation/Revit-MCP-Presentation.pptx
@@ -1,6 +1,6 @@
 
 <file path=ppt/presentation.xml><?xml version="1.0" encoding="utf-8"?>
-<p:presentation xmlns:a="http://schemas.openxmlformats.org/drawingml/2006/main" xmlns:r="http://schemas.openxmlformats.org/officeDocument/2006/relationships" xmlns:p="http://schemas.openxmlformats.org/presentationml/2006/main" saveSubsetFonts="1" autoCompressPictures="0">
+<p:presentation xmlns:a="http://schemas.openxmlformats.org/drawingml/2006/main" xmlns:p="http://schemas.openxmlformats.org/presentationml/2006/main" xmlns:r="http://schemas.openxmlformats.org/officeDocument/2006/relationships" saveSubsetFonts="1" autoCompressPictures="0">
   <p:sldMasterIdLst>
     <p:sldMasterId id="2147483648" r:id="rId1"/>
   </p:sldMasterIdLst>
@@ -8,6 +8,8 @@
     <p:sldId id="256" r:id="rId2"/>
     <p:sldId id="257" r:id="rId3"/>
     <p:sldId id="258" r:id="rId4"/>
+    <p:sldId id="266" r:id="rId12"/>
+    <p:sldId id="267" r:id="rId13"/>
     <p:sldId id="259" r:id="rId5"/>
     <p:sldId id="260" r:id="rId6"/>
     <p:sldId id="261" r:id="rId7"/>
@@ -1878,7 +1880,7 @@
                 <a:ea typeface="Arial" pitchFamily="34" charset="-122"/>
                 <a:cs typeface="Arial" pitchFamily="34" charset="-120"/>
               </a:rPr>
-              <a:t>Contact: [Your Phone Number]</a:t>
+              <a:t>Contact: [Add Your Phone Here]</a:t>
             </a:r>
             <a:endParaRPr lang="en-US" sz="1400" dirty="0"/>
           </a:p>
@@ -2118,7 +2120,7 @@
                 <a:ea typeface="Arial" pitchFamily="34" charset="-122"/>
                 <a:cs typeface="Arial" pitchFamily="34" charset="-120"/>
               </a:rPr>
-              <a:t>GitHub: [Your GitHub] | Phone: [Your Phone Number]</a:t>
+              <a:t>GitHub: github.com/Demolinator/Revit-MCP-CS | Phone: [Add Your Phone Here]</a:t>
             </a:r>
             <a:endParaRPr lang="en-US" sz="1600" dirty="0"/>
           </a:p>
@@ -2129,6 +2131,558 @@
   <p:clrMapOvr>
     <a:masterClrMapping/>
   </p:clrMapOvr>
+</p:sld>
+</file>
+
+<file path=ppt/slides/slide11.xml><?xml version="1.0" encoding="utf-8"?>
+<p:sld xmlns:a="http://schemas.openxmlformats.org/drawingml/2006/main" xmlns:p="http://schemas.openxmlformats.org/presentationml/2006/main" xmlns:r="http://schemas.openxmlformats.org/officeDocument/2006/relationships">
+  <p:cSld name="Slide 11">
+    <p:bg>
+      <p:bgPr>
+        <a:blipFill dpi="0" rotWithShape="1">
+          <a:blip r:embed="rId1">
+            <a:lum/>
+          </a:blip>
+          <a:srcRect/>
+          <a:stretch>
+            <a:fillRect/>
+          </a:stretch>
+        </a:blipFill>
+        <a:effectLst/>
+      </p:bgPr>
+    </p:bg>
+    <p:spTree>
+      <p:nvGrpSpPr>
+        <p:cNvPr id="1" name=""/>
+        <p:cNvGrpSpPr/>
+        <p:nvPr/>
+      </p:nvGrpSpPr>
+      <p:grpSpPr>
+        <a:xfrm>
+          <a:off x="0" y="0"/>
+          <a:ext cx="0" cy="0"/>
+          <a:chOff x="0" y="0"/>
+          <a:chExt cx="0" cy="0"/>
+        </a:xfrm>
+      </p:grpSpPr>
+      <p:sp>
+        <p:nvSpPr>
+          <p:cNvPr id="2" name="Shape 0"/>
+          <p:cNvSpPr/>
+          <p:nvPr/>
+        </p:nvSpPr>
+        <p:spPr>
+          <a:xfrm>
+            <a:off x="555575" y="507950"/>
+            <a:ext cx="0" cy="533400"/>
+          </a:xfrm>
+          <a:prstGeom prst="line">
+            <a:avLst/>
+          </a:prstGeom>
+          <a:noFill/>
+          <a:ln w="95250">
+            <a:solidFill>
+              <a:srgbClr val="00D4FF"/>
+            </a:solidFill>
+            <a:prstDash val="solid"/>
+          </a:ln>
+        </p:spPr>
+      </p:sp>
+      <p:sp>
+        <p:nvSpPr>
+          <p:cNvPr id="3" name="Text 1"/>
+          <p:cNvSpPr/>
+          <p:nvPr/>
+        </p:nvSpPr>
+        <p:spPr>
+          <a:xfrm>
+            <a:off x="857101" y="507950"/>
+            <a:ext cx="7934527" cy="533400"/>
+          </a:xfrm>
+          <a:prstGeom prst="rect">
+            <a:avLst/>
+          </a:prstGeom>
+          <a:noFill/>
+          <a:ln/>
+        </p:spPr>
+        <p:txBody>
+          <a:bodyPr wrap="square" lIns="0" tIns="0" rIns="0" bIns="0" rtlCol="0" anchor="t"/>
+          <a:lstStyle/>
+          <a:p>
+            <a:pPr algn="l" indent="0" marL="0">
+              <a:buNone/>
+            </a:pPr>
+            <a:r>
+              <a:rPr lang="en-US" sz="3600" b="1" dirty="0">
+                <a:solidFill>
+                  <a:srgbClr val="00D4FF"/>
+                </a:solidFill>
+                <a:latin typeface="Arial" pitchFamily="34" charset="0"/>
+                <a:ea typeface="Arial" pitchFamily="34" charset="-122"/>
+                <a:cs typeface="Arial" pitchFamily="34" charset="-120"/>
+              </a:rPr>
+              <a:t>What is BIM?</a:t>
+            </a:r>
+            <a:endParaRPr lang="en-US" sz="3600" dirty="0"/>
+          </a:p>
+        </p:txBody>
+      </p:sp>
+      <p:sp>
+        <p:nvSpPr>
+          <p:cNvPr id="4" name="Text 2"/>
+          <p:cNvSpPr/>
+          <p:nvPr/>
+        </p:nvSpPr>
+        <p:spPr>
+          <a:xfrm>
+            <a:off x="507950" y="1422350"/>
+            <a:ext cx="8290661" cy="419100"/>
+          </a:xfrm>
+          <a:prstGeom prst="rect">
+            <a:avLst/>
+          </a:prstGeom>
+          <a:noFill/>
+          <a:ln/>
+        </p:spPr>
+        <p:txBody>
+          <a:bodyPr wrap="square" lIns="0" tIns="0" rIns="0" bIns="0" rtlCol="0" anchor="t"/>
+          <a:lstStyle/>
+          <a:p>
+            <a:pPr algn="l" indent="0" marL="0">
+              <a:spcBef>
+                <a:spcPts val="3000"/>
+              </a:spcBef>
+              <a:spcAft>
+                <a:spcPts val="2000"/>
+              </a:spcAft>
+              <a:buNone/>
+            </a:pPr>
+            <a:r>
+              <a:rPr lang="en-US" sz="2800" dirty="0">
+                <a:solidFill>
+                  <a:srgbClr val="FFFFFF"/>
+                </a:solidFill>
+                <a:latin typeface="Arial" pitchFamily="34" charset="0"/>
+                <a:ea typeface="Arial" pitchFamily="34" charset="-122"/>
+                <a:cs typeface="Arial" pitchFamily="34" charset="-120"/>
+              </a:rPr>
+              <a:t>Building Information Modeling</a:t>
+            </a:r>
+            <a:endParaRPr lang="en-US" sz="2800" dirty="0"/>
+          </a:p>
+        </p:txBody>
+      </p:sp>
+      <p:sp>
+        <p:nvSpPr>
+          <p:cNvPr id="5" name="Text 3"/>
+          <p:cNvSpPr/>
+          <p:nvPr/>
+        </p:nvSpPr>
+        <p:spPr>
+          <a:xfrm>
+            <a:off x="507950" y="2095351"/>
+            <a:ext cx="8128099" cy="2102644"/>
+          </a:xfrm>
+          <a:prstGeom prst="rect">
+            <a:avLst/>
+          </a:prstGeom>
+          <a:noFill/>
+          <a:ln/>
+        </p:spPr>
+        <p:txBody>
+          <a:bodyPr wrap="square" lIns="254000" tIns="0" rIns="0" bIns="0" rtlCol="0" anchor="t"/>
+          <a:lstStyle/>
+          <a:p>
+            <a:pPr algn="l" marL="254000" indent="-254000">
+              <a:lnSpc>
+                <a:spcPts val="3240"/>
+              </a:lnSpc>
+              <a:spcAft>
+                <a:spcPts val="1200"/>
+              </a:spcAft>
+              <a:buSzPct val="100000"/>
+              <a:buChar char="&amp;#x2022;"/>
+            </a:pPr>
+            <a:r>
+              <a:rPr lang="en-US" sz="1800" dirty="0">
+                <a:solidFill>
+                  <a:srgbClr val="C9D1D9"/>
+                </a:solidFill>
+                <a:latin typeface="Arial" pitchFamily="34" charset="0"/>
+                <a:ea typeface="Arial" pitchFamily="34" charset="-122"/>
+                <a:cs typeface="Arial" pitchFamily="34" charset="-120"/>
+              </a:rPr>
+              <a:t>BIM connects all stakeholders with a single intelligent model</a:t>
+            </a:r>
+            <a:endParaRPr lang="en-US" sz="1800" dirty="0"/>
+          </a:p>
+          <a:p>
+            <a:pPr algn="l" marL="254000" indent="-254000">
+              <a:lnSpc>
+                <a:spcPts val="3240"/>
+              </a:lnSpc>
+              <a:spcAft>
+                <a:spcPts val="1200"/>
+              </a:spcAft>
+              <a:buSzPct val="100000"/>
+              <a:buChar char="&amp;#x2022;"/>
+            </a:pPr>
+            <a:r>
+              <a:rPr lang="en-US" sz="1800" dirty="0">
+                <a:solidFill>
+                  <a:srgbClr val="C9D1D9"/>
+                </a:solidFill>
+                <a:latin typeface="Arial" pitchFamily="34" charset="0"/>
+                <a:ea typeface="Arial" pitchFamily="34" charset="-122"/>
+                <a:cs typeface="Arial" pitchFamily="34" charset="-120"/>
+              </a:rPr>
+              <a:t>Building Information Modeling is a 3D model-based process for architecture, engineering, and construction</a:t>
+            </a:r>
+            <a:endParaRPr lang="en-US" sz="1800" dirty="0"/>
+          </a:p>
+          <a:p>
+            <a:pPr algn="l" marL="254000" indent="-254000">
+              <a:lnSpc>
+                <a:spcPts val="3240"/>
+              </a:lnSpc>
+              <a:spcAft>
+                <a:spcPts val="1200"/>
+              </a:spcAft>
+              <a:buSzPct val="100000"/>
+              <a:buChar char="&amp;#x2022;"/>
+            </a:pPr>
+            <a:r>
+              <a:rPr lang="en-US" sz="1800" dirty="0">
+                <a:solidFill>
+                  <a:srgbClr val="C9D1D9"/>
+                </a:solidFill>
+                <a:latin typeface="Arial" pitchFamily="34" charset="0"/>
+                <a:ea typeface="Arial" pitchFamily="34" charset="-122"/>
+                <a:cs typeface="Arial" pitchFamily="34" charset="-120"/>
+              </a:rPr>
+              <a:t>Key Components: Model-Based, Information-Rich, Multi-Dimensional (3D + 4D time + 5D cost + 6D sustainability)</a:t>
+            </a:r>
+            <a:endParaRPr lang="en-US" sz="1800" dirty="0"/>
+          </a:p>
+          <a:p>
+            <a:pPr algn="l" marL="254000" indent="-254000">
+              <a:lnSpc>
+                <a:spcPts val="3240"/>
+              </a:lnSpc>
+              <a:spcAft>
+                <a:spcPts val="1200"/>
+              </a:spcAft>
+              <a:buSzPct val="100000"/>
+              <a:buChar char="&amp;#x2022;"/>
+            </a:pPr>
+            <a:r>
+              <a:rPr lang="en-US" sz="1800" dirty="0">
+                <a:solidFill>
+                  <a:srgbClr val="C9D1D9"/>
+                </a:solidFill>
+                <a:latin typeface="Arial" pitchFamily="34" charset="0"/>
+                <a:ea typeface="Arial" pitchFamily="34" charset="-122"/>
+                <a:cs typeface="Arial" pitchFamily="34" charset="-120"/>
+              </a:rPr>
+              <a:t>Connected Stakeholders: Architects (design), Engineers (structural/MEP), Contractors (clash detection), Clients (visualization)</a:t>
+            </a:r>
+            <a:endParaRPr lang="en-US" sz="1800" dirty="0"/>
+          </a:p>
+        </p:txBody>
+      </p:sp>
+    </p:spTree>
+    <p:clrMapOvr>
+      <a:masterClrMapping/>
+    </p:clrMapOvr>
+  </p:cSld>
+</p:sld>
+</file>
+
+<file path=ppt/slides/slide12.xml><?xml version="1.0" encoding="utf-8"?>
+<p:sld xmlns:a="http://schemas.openxmlformats.org/drawingml/2006/main" xmlns:p="http://schemas.openxmlformats.org/presentationml/2006/main" xmlns:r="http://schemas.openxmlformats.org/officeDocument/2006/relationships">
+  <p:cSld name="Slide 12">
+    <p:bg>
+      <p:bgPr>
+        <a:blipFill dpi="0" rotWithShape="1">
+          <a:blip r:embed="rId1">
+            <a:lum/>
+          </a:blip>
+          <a:srcRect/>
+          <a:stretch>
+            <a:fillRect/>
+          </a:stretch>
+        </a:blipFill>
+        <a:effectLst/>
+      </p:bgPr>
+    </p:bg>
+    <p:spTree>
+      <p:nvGrpSpPr>
+        <p:cNvPr id="1" name=""/>
+        <p:cNvGrpSpPr/>
+        <p:nvPr/>
+      </p:nvGrpSpPr>
+      <p:grpSpPr>
+        <a:xfrm>
+          <a:off x="0" y="0"/>
+          <a:ext cx="0" cy="0"/>
+          <a:chOff x="0" y="0"/>
+          <a:chExt cx="0" cy="0"/>
+        </a:xfrm>
+      </p:grpSpPr>
+      <p:sp>
+        <p:nvSpPr>
+          <p:cNvPr id="2" name="Shape 0"/>
+          <p:cNvSpPr/>
+          <p:nvPr/>
+        </p:nvSpPr>
+        <p:spPr>
+          <a:xfrm>
+            <a:off x="555575" y="507950"/>
+            <a:ext cx="0" cy="533400"/>
+          </a:xfrm>
+          <a:prstGeom prst="line">
+            <a:avLst/>
+          </a:prstGeom>
+          <a:noFill/>
+          <a:ln w="95250">
+            <a:solidFill>
+              <a:srgbClr val="00D4FF"/>
+            </a:solidFill>
+            <a:prstDash val="solid"/>
+          </a:ln>
+        </p:spPr>
+      </p:sp>
+      <p:sp>
+        <p:nvSpPr>
+          <p:cNvPr id="3" name="Text 1"/>
+          <p:cNvSpPr/>
+          <p:nvPr/>
+        </p:nvSpPr>
+        <p:spPr>
+          <a:xfrm>
+            <a:off x="857101" y="507950"/>
+            <a:ext cx="7934527" cy="533400"/>
+          </a:xfrm>
+          <a:prstGeom prst="rect">
+            <a:avLst/>
+          </a:prstGeom>
+          <a:noFill/>
+          <a:ln/>
+        </p:spPr>
+        <p:txBody>
+          <a:bodyPr wrap="square" lIns="0" tIns="0" rIns="0" bIns="0" rtlCol="0" anchor="t"/>
+          <a:lstStyle/>
+          <a:p>
+            <a:pPr algn="l" indent="0" marL="0">
+              <a:buNone/>
+            </a:pPr>
+            <a:r>
+              <a:rPr lang="en-US" sz="3600" b="1" dirty="0">
+                <a:solidFill>
+                  <a:srgbClr val="00D4FF"/>
+                </a:solidFill>
+                <a:latin typeface="Arial" pitchFamily="34" charset="0"/>
+                <a:ea typeface="Arial" pitchFamily="34" charset="-122"/>
+                <a:cs typeface="Arial" pitchFamily="34" charset="-120"/>
+              </a:rPr>
+              <a:t>Parametric Modeling</a:t>
+            </a:r>
+            <a:endParaRPr lang="en-US" sz="3600" dirty="0"/>
+          </a:p>
+        </p:txBody>
+      </p:sp>
+      <p:sp>
+        <p:nvSpPr>
+          <p:cNvPr id="4" name="Text 2"/>
+          <p:cNvSpPr/>
+          <p:nvPr/>
+        </p:nvSpPr>
+        <p:spPr>
+          <a:xfrm>
+            <a:off x="507950" y="1422350"/>
+            <a:ext cx="8290661" cy="419100"/>
+          </a:xfrm>
+          <a:prstGeom prst="rect">
+            <a:avLst/>
+          </a:prstGeom>
+          <a:noFill/>
+          <a:ln/>
+        </p:spPr>
+        <p:txBody>
+          <a:bodyPr wrap="square" lIns="0" tIns="0" rIns="0" bIns="0" rtlCol="0" anchor="t"/>
+          <a:lstStyle/>
+          <a:p>
+            <a:pPr algn="l" indent="0" marL="0">
+              <a:spcBef>
+                <a:spcPts val="3000"/>
+              </a:spcBef>
+              <a:spcAft>
+                <a:spcPts val="2000"/>
+              </a:spcAft>
+              <a:buNone/>
+            </a:pPr>
+            <a:r>
+              <a:rPr lang="en-US" sz="2800" dirty="0">
+                <a:solidFill>
+                  <a:srgbClr val="FFFFFF"/>
+                </a:solidFill>
+                <a:latin typeface="Arial" pitchFamily="34" charset="0"/>
+                <a:ea typeface="Arial" pitchFamily="34" charset="-122"/>
+                <a:cs typeface="Arial" pitchFamily="34" charset="-120"/>
+              </a:rPr>
+              <a:t>Why It Powers BIM Software Like Revit</a:t>
+            </a:r>
+            <a:endParaRPr lang="en-US" sz="2800" dirty="0"/>
+          </a:p>
+        </p:txBody>
+      </p:sp>
+      <p:sp>
+        <p:nvSpPr>
+          <p:cNvPr id="5" name="Text 3"/>
+          <p:cNvSpPr/>
+          <p:nvPr/>
+        </p:nvSpPr>
+        <p:spPr>
+          <a:xfrm>
+            <a:off x="507950" y="2095351"/>
+            <a:ext cx="8128099" cy="2102644"/>
+          </a:xfrm>
+          <a:prstGeom prst="rect">
+            <a:avLst/>
+          </a:prstGeom>
+          <a:noFill/>
+          <a:ln/>
+        </p:spPr>
+        <p:txBody>
+          <a:bodyPr wrap="square" lIns="254000" tIns="0" rIns="0" bIns="0" rtlCol="0" anchor="t"/>
+          <a:lstStyle/>
+          <a:p>
+            <a:pPr algn="l" marL="254000" indent="-254000">
+              <a:lnSpc>
+                <a:spcPts val="3240"/>
+              </a:lnSpc>
+              <a:spcAft>
+                <a:spcPts val="1200"/>
+              </a:spcAft>
+              <a:buSzPct val="100000"/>
+              <a:buChar char="&amp;#x2022;"/>
+            </a:pPr>
+            <a:r>
+              <a:rPr lang="en-US" sz="1800" dirty="0">
+                <a:solidFill>
+                  <a:srgbClr val="C9D1D9"/>
+                </a:solidFill>
+                <a:latin typeface="Arial" pitchFamily="34" charset="0"/>
+                <a:ea typeface="Arial" pitchFamily="34" charset="-122"/>
+                <a:cs typeface="Arial" pitchFamily="34" charset="-120"/>
+              </a:rPr>
+              <a:t>Elements defined by parameters and relationships — objects are 'smart'</a:t>
+            </a:r>
+            <a:endParaRPr lang="en-US" sz="1800" dirty="0"/>
+          </a:p>
+          <a:p>
+            <a:pPr algn="l" marL="254000" indent="-254000">
+              <a:lnSpc>
+                <a:spcPts val="3240"/>
+              </a:lnSpc>
+              <a:spcAft>
+                <a:spcPts val="1200"/>
+              </a:spcAft>
+              <a:buSzPct val="100000"/>
+              <a:buChar char="&amp;#x2022;"/>
+            </a:pPr>
+            <a:r>
+              <a:rPr lang="en-US" sz="1800" dirty="0">
+                <a:solidFill>
+                  <a:srgbClr val="C9D1D9"/>
+                </a:solidFill>
+                <a:latin typeface="Arial" pitchFamily="34" charset="0"/>
+                <a:ea typeface="Arial" pitchFamily="34" charset="-122"/>
+                <a:cs typeface="Arial" pitchFamily="34" charset="-120"/>
+              </a:rPr>
+              <a:t>Automatic Coordination: Move a wall — doors, windows, dimensions, schedules update</a:t>
+            </a:r>
+            <a:endParaRPr lang="en-US" sz="1800" dirty="0"/>
+          </a:p>
+          <a:p>
+            <a:pPr algn="l" marL="254000" indent="-254000">
+              <a:lnSpc>
+                <a:spcPts val="3240"/>
+              </a:lnSpc>
+              <a:spcAft>
+                <a:spcPts val="1200"/>
+              </a:spcAft>
+              <a:buSzPct val="100000"/>
+              <a:buChar char="&amp;#x2022;"/>
+            </a:pPr>
+            <a:r>
+              <a:rPr lang="en-US" sz="1800" dirty="0">
+                <a:solidFill>
+                  <a:srgbClr val="C9D1D9"/>
+                </a:solidFill>
+                <a:latin typeface="Arial" pitchFamily="34" charset="0"/>
+                <a:ea typeface="Arial" pitchFamily="34" charset="-122"/>
+                <a:cs typeface="Arial" pitchFamily="34" charset="-120"/>
+              </a:rPr>
+              <a:t>Design Iteration: Rapidly explore options without manual redrafting</a:t>
+            </a:r>
+            <a:endParaRPr lang="en-US" sz="1800" dirty="0"/>
+          </a:p>
+          <a:p>
+            <a:pPr algn="l" marL="254000" indent="-254000">
+              <a:lnSpc>
+                <a:spcPts val="3240"/>
+              </a:lnSpc>
+              <a:spcAft>
+                <a:spcPts val="1200"/>
+              </a:spcAft>
+              <a:buSzPct val="100000"/>
+              <a:buChar char="&amp;#x2022;"/>
+            </a:pPr>
+            <a:r>
+              <a:rPr lang="en-US" sz="1800" dirty="0">
+                <a:solidFill>
+                  <a:srgbClr val="C9D1D9"/>
+                </a:solidFill>
+                <a:latin typeface="Arial" pitchFamily="34" charset="0"/>
+                <a:ea typeface="Arial" pitchFamily="34" charset="-122"/>
+                <a:cs typeface="Arial" pitchFamily="34" charset="-120"/>
+              </a:rPr>
+              <a:t>Data-Driven: Quantities, costs, schedules always accurate</a:t>
+            </a:r>
+            <a:endParaRPr lang="en-US" sz="1800" dirty="0"/>
+          </a:p>
+          <a:p>
+            <a:pPr algn="l" marL="254000" indent="-254000">
+              <a:lnSpc>
+                <a:spcPts val="3240"/>
+              </a:lnSpc>
+              <a:spcAft>
+                <a:spcPts val="1200"/>
+              </a:spcAft>
+              <a:buSzPct val="100000"/>
+              <a:buChar char="&amp;#x2022;"/>
+            </a:pPr>
+            <a:r>
+              <a:rPr lang="en-US" sz="1800" dirty="0">
+                <a:solidFill>
+                  <a:srgbClr val="C9D1D9"/>
+                </a:solidFill>
+                <a:latin typeface="Arial" pitchFamily="34" charset="0"/>
+                <a:ea typeface="Arial" pitchFamily="34" charset="-122"/>
+                <a:cs typeface="Arial" pitchFamily="34" charset="-120"/>
+              </a:rPr>
+              <a:t>Example: Change wall height from 3000mm to 3500mm — all connected elements update instantly</a:t>
+            </a:r>
+            <a:endParaRPr lang="en-US" sz="1800" dirty="0"/>
+          </a:p>
+        </p:txBody>
+      </p:sp>
+    </p:spTree>
+    <p:clrMapOvr>
+      <a:masterClrMapping/>
+    </p:clrMapOvr>
+  </p:cSld>
 </p:sld>
 </file>
 
@@ -3382,6 +3936,121 @@
           </a:p>
         </p:txBody>
       </p:sp>
+      <p:sp>
+        <p:nvSpPr>
+          <p:cNvPr id="20" name="Text 18"/>
+          <p:cNvSpPr/>
+          <p:nvPr/>
+        </p:nvSpPr>
+        <p:spPr>
+          <a:xfrm>
+            <a:off x="507950" y="2743200"/>
+            <a:ext cx="8128099" cy="1587500"/>
+          </a:xfrm>
+          <a:prstGeom prst="rect">
+            <a:avLst/>
+          </a:prstGeom>
+          <a:noFill/>
+          <a:ln/>
+        </p:spPr>
+        <p:txBody>
+          <a:bodyPr wrap="square" lIns="254000" tIns="0" rIns="0" bIns="0" rtlCol="0" anchor="t"/>
+          <a:lstStyle/>
+          <a:p>
+            <a:pPr algn="l" marL="254000" indent="-254000">
+              <a:lnSpc>
+                <a:spcPts val="3240"/>
+              </a:lnSpc>
+              <a:spcAft>
+                <a:spcPts val="1200"/>
+              </a:spcAft>
+              <a:buSzPct val="100000"/>
+              <a:buChar char="•"/>
+            </a:pPr>
+            <a:r>
+              <a:rPr lang="en-US" sz="1800" dirty="0">
+                <a:solidFill>
+                  <a:srgbClr val="C9D1D9"/>
+                </a:solidFill>
+                <a:latin typeface="Arial" pitchFamily="34" charset="0"/>
+                <a:ea typeface="Arial" pitchFamily="34" charset="-122"/>
+                <a:cs typeface="Arial" pitchFamily="34" charset="-120"/>
+              </a:rPr>
+              <a:t>Claude Code connects to MCP Server running on WSL2</a:t>
+            </a:r>
+            <a:endParaRPr lang="en-US" sz="1800" dirty="0"/>
+          </a:p>
+          <a:p>
+            <a:pPr algn="l" marL="254000" indent="-254000">
+              <a:lnSpc>
+                <a:spcPts val="3240"/>
+              </a:lnSpc>
+              <a:spcAft>
+                <a:spcPts val="1200"/>
+              </a:spcAft>
+              <a:buSzPct val="100000"/>
+              <a:buChar char="•"/>
+            </a:pPr>
+            <a:r>
+              <a:rPr lang="en-US" sz="1800" dirty="0">
+                <a:solidFill>
+                  <a:srgbClr val="C9D1D9"/>
+                </a:solidFill>
+                <a:latin typeface="Arial" pitchFamily="34" charset="0"/>
+                <a:ea typeface="Arial" pitchFamily="34" charset="-122"/>
+                <a:cs typeface="Arial" pitchFamily="34" charset="-120"/>
+              </a:rPr>
+              <a:t>MCP Server communicates with Revit Plugin via TCP on port 8080</a:t>
+            </a:r>
+            <a:endParaRPr lang="en-US" sz="1800" dirty="0"/>
+          </a:p>
+          <a:p>
+            <a:pPr algn="l" marL="254000" indent="-254000">
+              <a:lnSpc>
+                <a:spcPts val="3240"/>
+              </a:lnSpc>
+              <a:spcAft>
+                <a:spcPts val="1200"/>
+              </a:spcAft>
+              <a:buSzPct val="100000"/>
+              <a:buChar char="•"/>
+            </a:pPr>
+            <a:r>
+              <a:rPr lang="en-US" sz="1800" dirty="0">
+                <a:solidFill>
+                  <a:srgbClr val="C9D1D9"/>
+                </a:solidFill>
+                <a:latin typeface="Arial" pitchFamily="34" charset="0"/>
+                <a:ea typeface="Arial" pitchFamily="34" charset="-122"/>
+                <a:cs typeface="Arial" pitchFamily="34" charset="-120"/>
+              </a:rPr>
+              <a:t>Revit Plugin (C#) translates commands and controls Revit API</a:t>
+            </a:r>
+            <a:endParaRPr lang="en-US" sz="1800" dirty="0"/>
+          </a:p>
+          <a:p>
+            <a:pPr algn="l" marL="254000" indent="-254000">
+              <a:lnSpc>
+                <a:spcPts val="3240"/>
+              </a:lnSpc>
+              <a:buSzPct val="100000"/>
+              <a:buChar char="•"/>
+            </a:pPr>
+            <a:r>
+              <a:rPr lang="en-US" sz="1800" dirty="0">
+                <a:solidFill>
+                  <a:srgbClr val="C9D1D9"/>
+                </a:solidFill>
+                <a:latin typeface="Arial" pitchFamily="34" charset="0"/>
+                <a:ea typeface="Arial" pitchFamily="34" charset="-122"/>
+                <a:cs typeface="Arial" pitchFamily="34" charset="-120"/>
+              </a:rPr>
+              <a:t>Bridge connects WSL2/Linux environment to Windows host</a:t>
+            </a:r>
+            <a:endParaRPr lang="en-US" sz="1800" dirty="0"/>
+          </a:p>
+        </p:txBody>
+      </p:sp>
     </p:spTree>
   </p:cSld>
   <p:clrMapOvr>
@@ -5037,7 +5706,7 @@
                 <a:ea typeface="Arial" pitchFamily="34" charset="-122"/>
                 <a:cs typeface="Arial" pitchFamily="34" charset="-120"/>
               </a:rPr>
-              <a:t>Digital twins from natural language</a:t>
+              <a:t>digital twins from natural language</a:t>
             </a:r>
             <a:endParaRPr lang="en-US" sz="1800" dirty="0"/>
           </a:p>

</xml_diff>